<commit_message>
complete BestPractice presentaion and code exapmles
</commit_message>
<xml_diff>
--- a/Test Driven Development/materials/pptx/11. TDD-Best-Practice.pptx
+++ b/Test Driven Development/materials/pptx/11. TDD-Best-Practice.pptx
@@ -21831,6 +21831,14 @@
                 </a:buClr>
                 <a:buSzPct val="125000"/>
               </a:pPr>
+              <a:r>
+                <a:rPr lang="en-US" dirty="0">
+                  <a:solidFill>
+                    <a:srgbClr val="004080"/>
+                  </a:solidFill>
+                </a:rPr>
+                <a:t>Best Practices </a:t>
+              </a:r>
               <a:endParaRPr lang="ru-RU" dirty="0">
                 <a:solidFill>
                   <a:srgbClr val="004080"/>
@@ -22102,6 +22110,14 @@
                 </a:buClr>
                 <a:buSzPct val="125000"/>
               </a:pPr>
+              <a:r>
+                <a:rPr lang="ru-RU" dirty="0">
+                  <a:solidFill>
+                    <a:srgbClr val="004080"/>
+                  </a:solidFill>
+                </a:rPr>
+                <a:t>Начинаем с наименее зависимых</a:t>
+              </a:r>
               <a:endParaRPr lang="en-US" dirty="0">
                 <a:solidFill>
                   <a:srgbClr val="004080"/>
@@ -22373,6 +22389,22 @@
                 </a:buClr>
                 <a:buSzPct val="125000"/>
               </a:pPr>
+              <a:r>
+                <a:rPr lang="ru-RU" dirty="0" smtClean="0">
+                  <a:solidFill>
+                    <a:srgbClr val="004080"/>
+                  </a:solidFill>
+                </a:rPr>
+                <a:t>Простые </a:t>
+              </a:r>
+              <a:r>
+                <a:rPr lang="ru-RU" dirty="0">
+                  <a:solidFill>
+                    <a:srgbClr val="004080"/>
+                  </a:solidFill>
+                </a:rPr>
+                <a:t>тесты</a:t>
+              </a:r>
               <a:endParaRPr lang="en-US" dirty="0" smtClean="0">
                 <a:solidFill>
                   <a:srgbClr val="004080"/>
@@ -22644,6 +22676,14 @@
                 </a:buClr>
                 <a:buSzPct val="125000"/>
               </a:pPr>
+              <a:r>
+                <a:rPr lang="ru-RU" dirty="0">
+                  <a:solidFill>
+                    <a:srgbClr val="004080"/>
+                  </a:solidFill>
+                </a:rPr>
+                <a:t>Константы в проверках</a:t>
+              </a:r>
               <a:endParaRPr lang="en-US" dirty="0">
                 <a:solidFill>
                   <a:srgbClr val="004080"/>
@@ -22915,6 +22955,14 @@
                 </a:buClr>
                 <a:buSzPct val="125000"/>
               </a:pPr>
+              <a:r>
+                <a:rPr lang="ru-RU" dirty="0">
+                  <a:solidFill>
+                    <a:srgbClr val="004080"/>
+                  </a:solidFill>
+                </a:rPr>
+                <a:t>Измеряйте покрытие</a:t>
+              </a:r>
               <a:endParaRPr lang="en-US" dirty="0" smtClean="0">
                 <a:solidFill>
                   <a:srgbClr val="004080"/>
@@ -23186,6 +23234,22 @@
                 </a:buClr>
                 <a:buSzPct val="125000"/>
               </a:pPr>
+              <a:r>
+                <a:rPr lang="it-IT" dirty="0">
+                  <a:solidFill>
+                    <a:srgbClr val="004080"/>
+                  </a:solidFill>
+                </a:rPr>
+                <a:t>Тестирование private </a:t>
+              </a:r>
+              <a:r>
+                <a:rPr lang="it-IT" dirty="0" err="1" smtClean="0">
+                  <a:solidFill>
+                    <a:srgbClr val="004080"/>
+                  </a:solidFill>
+                </a:rPr>
+                <a:t>методов</a:t>
+              </a:r>
               <a:endParaRPr lang="en-US" dirty="0" smtClean="0">
                 <a:solidFill>
                   <a:srgbClr val="004080"/>
@@ -23457,6 +23521,22 @@
                 </a:buClr>
                 <a:buSzPct val="125000"/>
               </a:pPr>
+              <a:r>
+                <a:rPr lang="ru-RU" dirty="0" smtClean="0">
+                  <a:solidFill>
+                    <a:srgbClr val="004080"/>
+                  </a:solidFill>
+                </a:rPr>
+                <a:t>Полная </a:t>
+              </a:r>
+              <a:r>
+                <a:rPr lang="ru-RU" dirty="0" err="1" smtClean="0">
+                  <a:solidFill>
+                    <a:srgbClr val="004080"/>
+                  </a:solidFill>
+                </a:rPr>
+                <a:t>автоматизиция</a:t>
+              </a:r>
               <a:endParaRPr lang="en-US" dirty="0">
                 <a:solidFill>
                   <a:srgbClr val="004080"/>

</xml_diff>